<commit_message>
Update Evolving your Power BI Architecture using Dataflows and Shared Datasets.pptx
</commit_message>
<xml_diff>
--- a/Evolve Power BI Architecture/Evolving your Power BI Architecture using Dataflows and Shared Datasets.pptx
+++ b/Evolve Power BI Architecture/Evolving your Power BI Architecture using Dataflows and Shared Datasets.pptx
@@ -8131,13 +8131,15 @@
               </a:ext>
             </a:extLst>
           </p:cNvPr>
-          <p:cNvCxnSpPr/>
+          <p:cNvCxnSpPr>
+            <a:cxnSpLocks/>
+          </p:cNvCxnSpPr>
           <p:nvPr/>
         </p:nvCxnSpPr>
         <p:spPr>
           <a:xfrm>
-            <a:off x="5882227" y="1214371"/>
-            <a:ext cx="0" cy="4650537"/>
+            <a:off x="5882227" y="906011"/>
+            <a:ext cx="0" cy="4958897"/>
           </a:xfrm>
           <a:prstGeom prst="line">
             <a:avLst/>
@@ -8360,6 +8362,59 @@
                 <a:cs typeface="Segoe UI" panose="020B0502040204020203" pitchFamily="34" charset="0"/>
               </a:rPr>
               <a:t>Dataflows</a:t>
+            </a:r>
+          </a:p>
+        </p:txBody>
+      </p:sp>
+      <p:sp>
+        <p:nvSpPr>
+          <p:cNvPr id="3" name="Speech Bubble: Oval 2">
+            <a:extLst>
+              <a:ext uri="{FF2B5EF4-FFF2-40B4-BE49-F238E27FC236}">
+                <a16:creationId xmlns:a16="http://schemas.microsoft.com/office/drawing/2014/main" id="{64DA67E0-0CD8-40E8-B8A2-F50CD0CCC534}"/>
+              </a:ext>
+            </a:extLst>
+          </p:cNvPr>
+          <p:cNvSpPr/>
+          <p:nvPr/>
+        </p:nvSpPr>
+        <p:spPr>
+          <a:xfrm>
+            <a:off x="4688932" y="1197424"/>
+            <a:ext cx="1884709" cy="1074794"/>
+          </a:xfrm>
+          <a:prstGeom prst="wedgeEllipseCallout">
+            <a:avLst>
+              <a:gd name="adj1" fmla="val -83639"/>
+              <a:gd name="adj2" fmla="val -25269"/>
+            </a:avLst>
+          </a:prstGeom>
+          <a:solidFill>
+            <a:schemeClr val="bg1"/>
+          </a:solidFill>
+        </p:spPr>
+        <p:style>
+          <a:lnRef idx="2">
+            <a:schemeClr val="accent2"/>
+          </a:lnRef>
+          <a:fillRef idx="1">
+            <a:schemeClr val="lt1"/>
+          </a:fillRef>
+          <a:effectRef idx="0">
+            <a:schemeClr val="accent2"/>
+          </a:effectRef>
+          <a:fontRef idx="minor">
+            <a:schemeClr val="dk1"/>
+          </a:fontRef>
+        </p:style>
+        <p:txBody>
+          <a:bodyPr rtlCol="0" anchor="ctr"/>
+          <a:lstStyle/>
+          <a:p>
+            <a:pPr algn="ctr"/>
+            <a:r>
+              <a:rPr lang="en-IE" sz="1050" dirty="0"/>
+              <a:t>More on dataflows in Dennes’s session next!</a:t>
             </a:r>
           </a:p>
         </p:txBody>
@@ -8394,6 +8449,55 @@
           <a:chExt cx="0" cy="0"/>
         </a:xfrm>
       </p:grpSpPr>
+      <p:sp>
+        <p:nvSpPr>
+          <p:cNvPr id="34" name="Rectangle 33">
+            <a:extLst>
+              <a:ext uri="{FF2B5EF4-FFF2-40B4-BE49-F238E27FC236}">
+                <a16:creationId xmlns:a16="http://schemas.microsoft.com/office/drawing/2014/main" id="{2BEAC518-AFCA-4F01-A8B4-F5CCD70720DB}"/>
+              </a:ext>
+            </a:extLst>
+          </p:cNvPr>
+          <p:cNvSpPr/>
+          <p:nvPr/>
+        </p:nvSpPr>
+        <p:spPr>
+          <a:xfrm>
+            <a:off x="-1" y="1656036"/>
+            <a:ext cx="8384661" cy="2490219"/>
+          </a:xfrm>
+          <a:prstGeom prst="rect">
+            <a:avLst/>
+          </a:prstGeom>
+          <a:ln>
+            <a:noFill/>
+          </a:ln>
+        </p:spPr>
+        <p:style>
+          <a:lnRef idx="2">
+            <a:schemeClr val="accent1">
+              <a:shade val="50000"/>
+            </a:schemeClr>
+          </a:lnRef>
+          <a:fillRef idx="1">
+            <a:schemeClr val="accent1"/>
+          </a:fillRef>
+          <a:effectRef idx="0">
+            <a:schemeClr val="accent1"/>
+          </a:effectRef>
+          <a:fontRef idx="minor">
+            <a:schemeClr val="lt1"/>
+          </a:fontRef>
+        </p:style>
+        <p:txBody>
+          <a:bodyPr rtlCol="0" anchor="ctr"/>
+          <a:lstStyle/>
+          <a:p>
+            <a:pPr algn="ctr"/>
+            <a:endParaRPr lang="en-IE"/>
+          </a:p>
+        </p:txBody>
+      </p:sp>
       <p:sp>
         <p:nvSpPr>
           <p:cNvPr id="2" name="TextBox 1"/>
@@ -10163,7 +10267,7 @@
             </a:ln>
             <a:extLst>
               <a:ext uri="{91240B29-F687-4f45-9708-019B960494DF}">
-                <a14:hiddenLine xmlns:a14="http://schemas.microsoft.com/office/drawing/2010/main" xmlns="" w="9525">
+                <a14:hiddenLine xmlns="" xmlns:a14="http://schemas.microsoft.com/office/drawing/2010/main" w="9525">
                   <a:solidFill>
                     <a:srgbClr val="000000"/>
                   </a:solidFill>
@@ -10483,8 +10587,8 @@
         </p:blipFill>
         <p:spPr>
           <a:xfrm>
-            <a:off x="8744076" y="1863941"/>
-            <a:ext cx="3447924" cy="1994467"/>
+            <a:off x="8384661" y="1656037"/>
+            <a:ext cx="3807339" cy="2202372"/>
           </a:xfrm>
           <a:prstGeom prst="rect">
             <a:avLst/>
@@ -10505,7 +10609,7 @@
         </p:nvSpPr>
         <p:spPr>
           <a:xfrm>
-            <a:off x="1359475" y="3458298"/>
+            <a:off x="1400759" y="682070"/>
             <a:ext cx="4488729" cy="400110"/>
           </a:xfrm>
           <a:prstGeom prst="rect">
@@ -10550,7 +10654,7 @@
         </p:nvSpPr>
         <p:spPr>
           <a:xfrm>
-            <a:off x="0" y="3458298"/>
+            <a:off x="41284" y="682070"/>
             <a:ext cx="1359475" cy="400110"/>
           </a:xfrm>
           <a:prstGeom prst="rect">
@@ -10574,6 +10678,281 @@
                 </a:solidFill>
               </a:rPr>
               <a:t>Slides, etc:</a:t>
+            </a:r>
+          </a:p>
+        </p:txBody>
+      </p:sp>
+      <p:sp>
+        <p:nvSpPr>
+          <p:cNvPr id="27" name="TextBox 26">
+            <a:extLst>
+              <a:ext uri="{FF2B5EF4-FFF2-40B4-BE49-F238E27FC236}">
+                <a16:creationId xmlns:a16="http://schemas.microsoft.com/office/drawing/2014/main" id="{27DE8A75-28CD-41A6-8AE6-4E4C7A5ED881}"/>
+              </a:ext>
+            </a:extLst>
+          </p:cNvPr>
+          <p:cNvSpPr txBox="1"/>
+          <p:nvPr/>
+        </p:nvSpPr>
+        <p:spPr>
+          <a:xfrm>
+            <a:off x="1343767" y="2281528"/>
+            <a:ext cx="7040893" cy="276999"/>
+          </a:xfrm>
+          <a:prstGeom prst="rect">
+            <a:avLst/>
+          </a:prstGeom>
+          <a:noFill/>
+        </p:spPr>
+        <p:txBody>
+          <a:bodyPr wrap="square">
+            <a:spAutoFit/>
+          </a:bodyPr>
+          <a:lstStyle/>
+          <a:p>
+            <a:r>
+              <a:rPr lang="en-IE" sz="1200" dirty="0">
+                <a:solidFill>
+                  <a:schemeClr val="bg1"/>
+                </a:solidFill>
+              </a:rPr>
+              <a:t>https://docs.microsoft.com/en-us/power-bi/guidance/whitepaper-powerbi-enterprise-deployment</a:t>
+            </a:r>
+          </a:p>
+        </p:txBody>
+      </p:sp>
+      <p:sp>
+        <p:nvSpPr>
+          <p:cNvPr id="5" name="TextBox 4">
+            <a:extLst>
+              <a:ext uri="{FF2B5EF4-FFF2-40B4-BE49-F238E27FC236}">
+                <a16:creationId xmlns:a16="http://schemas.microsoft.com/office/drawing/2014/main" id="{A4319C3C-0B2E-4E30-B8D9-3AE0C4BA7E02}"/>
+              </a:ext>
+            </a:extLst>
+          </p:cNvPr>
+          <p:cNvSpPr txBox="1"/>
+          <p:nvPr/>
+        </p:nvSpPr>
+        <p:spPr>
+          <a:xfrm>
+            <a:off x="0" y="1521087"/>
+            <a:ext cx="1414170" cy="400110"/>
+          </a:xfrm>
+          <a:prstGeom prst="rect">
+            <a:avLst/>
+          </a:prstGeom>
+          <a:solidFill>
+            <a:srgbClr val="0271AF"/>
+          </a:solidFill>
+        </p:spPr>
+        <p:txBody>
+          <a:bodyPr wrap="none" rtlCol="0">
+            <a:spAutoFit/>
+          </a:bodyPr>
+          <a:lstStyle/>
+          <a:p>
+            <a:r>
+              <a:rPr lang="en-IE" sz="2000" dirty="0">
+                <a:solidFill>
+                  <a:schemeClr val="bg1"/>
+                </a:solidFill>
+              </a:rPr>
+              <a:t>Other links</a:t>
+            </a:r>
+          </a:p>
+        </p:txBody>
+      </p:sp>
+      <p:sp>
+        <p:nvSpPr>
+          <p:cNvPr id="30" name="TextBox 29">
+            <a:extLst>
+              <a:ext uri="{FF2B5EF4-FFF2-40B4-BE49-F238E27FC236}">
+                <a16:creationId xmlns:a16="http://schemas.microsoft.com/office/drawing/2014/main" id="{162728D2-48AF-418D-BC66-D98E25E9A023}"/>
+              </a:ext>
+            </a:extLst>
+          </p:cNvPr>
+          <p:cNvSpPr txBox="1"/>
+          <p:nvPr/>
+        </p:nvSpPr>
+        <p:spPr>
+          <a:xfrm>
+            <a:off x="1337556" y="2831994"/>
+            <a:ext cx="7148179" cy="276999"/>
+          </a:xfrm>
+          <a:prstGeom prst="rect">
+            <a:avLst/>
+          </a:prstGeom>
+          <a:noFill/>
+        </p:spPr>
+        <p:txBody>
+          <a:bodyPr wrap="square">
+            <a:spAutoFit/>
+          </a:bodyPr>
+          <a:lstStyle/>
+          <a:p>
+            <a:r>
+              <a:rPr lang="en-IE" sz="1200" dirty="0">
+                <a:solidFill>
+                  <a:schemeClr val="bg1"/>
+                </a:solidFill>
+              </a:rPr>
+              <a:t>https://docs.microsoft.com/en-us/power-bi/connect-data/service-datasets-share</a:t>
+            </a:r>
+          </a:p>
+        </p:txBody>
+      </p:sp>
+      <p:sp>
+        <p:nvSpPr>
+          <p:cNvPr id="32" name="TextBox 31">
+            <a:extLst>
+              <a:ext uri="{FF2B5EF4-FFF2-40B4-BE49-F238E27FC236}">
+                <a16:creationId xmlns:a16="http://schemas.microsoft.com/office/drawing/2014/main" id="{48BF06B2-A476-4B2B-AB06-69779B9A813E}"/>
+              </a:ext>
+            </a:extLst>
+          </p:cNvPr>
+          <p:cNvSpPr txBox="1"/>
+          <p:nvPr/>
+        </p:nvSpPr>
+        <p:spPr>
+          <a:xfrm>
+            <a:off x="1306658" y="3397908"/>
+            <a:ext cx="7011998" cy="261610"/>
+          </a:xfrm>
+          <a:prstGeom prst="rect">
+            <a:avLst/>
+          </a:prstGeom>
+          <a:noFill/>
+        </p:spPr>
+        <p:txBody>
+          <a:bodyPr wrap="square">
+            <a:spAutoFit/>
+          </a:bodyPr>
+          <a:lstStyle/>
+          <a:p>
+            <a:r>
+              <a:rPr lang="en-IE" sz="1100" dirty="0">
+                <a:solidFill>
+                  <a:schemeClr val="bg1"/>
+                </a:solidFill>
+              </a:rPr>
+              <a:t>https://docs.microsoft.com/en-us/power-bi/transform-model/dataflows/dataflows-introduction-self-service</a:t>
+            </a:r>
+          </a:p>
+        </p:txBody>
+      </p:sp>
+      <p:sp>
+        <p:nvSpPr>
+          <p:cNvPr id="20" name="TextBox 19">
+            <a:extLst>
+              <a:ext uri="{FF2B5EF4-FFF2-40B4-BE49-F238E27FC236}">
+                <a16:creationId xmlns:a16="http://schemas.microsoft.com/office/drawing/2014/main" id="{8FF3956F-D1F7-4B7C-BF96-E6E9BE84D5BA}"/>
+              </a:ext>
+            </a:extLst>
+          </p:cNvPr>
+          <p:cNvSpPr txBox="1"/>
+          <p:nvPr/>
+        </p:nvSpPr>
+        <p:spPr>
+          <a:xfrm>
+            <a:off x="-2" y="2010057"/>
+            <a:ext cx="2973506" cy="307777"/>
+          </a:xfrm>
+          <a:prstGeom prst="rect">
+            <a:avLst/>
+          </a:prstGeom>
+          <a:noFill/>
+        </p:spPr>
+        <p:txBody>
+          <a:bodyPr wrap="none" rtlCol="0">
+            <a:spAutoFit/>
+          </a:bodyPr>
+          <a:lstStyle/>
+          <a:p>
+            <a:r>
+              <a:rPr lang="en-IE" sz="1400" dirty="0">
+                <a:solidFill>
+                  <a:schemeClr val="bg1"/>
+                </a:solidFill>
+              </a:rPr>
+              <a:t>Enterprise Deployment Whitepaper</a:t>
+            </a:r>
+          </a:p>
+        </p:txBody>
+      </p:sp>
+      <p:sp>
+        <p:nvSpPr>
+          <p:cNvPr id="36" name="TextBox 35">
+            <a:extLst>
+              <a:ext uri="{FF2B5EF4-FFF2-40B4-BE49-F238E27FC236}">
+                <a16:creationId xmlns:a16="http://schemas.microsoft.com/office/drawing/2014/main" id="{4910D7F7-8D9B-4D53-B862-23268013D102}"/>
+              </a:ext>
+            </a:extLst>
+          </p:cNvPr>
+          <p:cNvSpPr txBox="1"/>
+          <p:nvPr/>
+        </p:nvSpPr>
+        <p:spPr>
+          <a:xfrm>
+            <a:off x="-2" y="2603334"/>
+            <a:ext cx="1463093" cy="307777"/>
+          </a:xfrm>
+          <a:prstGeom prst="rect">
+            <a:avLst/>
+          </a:prstGeom>
+          <a:noFill/>
+        </p:spPr>
+        <p:txBody>
+          <a:bodyPr wrap="none" rtlCol="0">
+            <a:spAutoFit/>
+          </a:bodyPr>
+          <a:lstStyle/>
+          <a:p>
+            <a:r>
+              <a:rPr lang="en-IE" sz="1400" dirty="0">
+                <a:solidFill>
+                  <a:schemeClr val="bg1"/>
+                </a:solidFill>
+              </a:rPr>
+              <a:t>Shared Datasets</a:t>
+            </a:r>
+          </a:p>
+        </p:txBody>
+      </p:sp>
+      <p:sp>
+        <p:nvSpPr>
+          <p:cNvPr id="38" name="TextBox 37">
+            <a:extLst>
+              <a:ext uri="{FF2B5EF4-FFF2-40B4-BE49-F238E27FC236}">
+                <a16:creationId xmlns:a16="http://schemas.microsoft.com/office/drawing/2014/main" id="{982A0E61-FABF-4E07-93A7-AF54DCD79656}"/>
+              </a:ext>
+            </a:extLst>
+          </p:cNvPr>
+          <p:cNvSpPr txBox="1"/>
+          <p:nvPr/>
+        </p:nvSpPr>
+        <p:spPr>
+          <a:xfrm>
+            <a:off x="-2" y="3170488"/>
+            <a:ext cx="966931" cy="307777"/>
+          </a:xfrm>
+          <a:prstGeom prst="rect">
+            <a:avLst/>
+          </a:prstGeom>
+          <a:noFill/>
+        </p:spPr>
+        <p:txBody>
+          <a:bodyPr wrap="none" rtlCol="0">
+            <a:spAutoFit/>
+          </a:bodyPr>
+          <a:lstStyle/>
+          <a:p>
+            <a:r>
+              <a:rPr lang="en-IE" sz="1400" dirty="0">
+                <a:solidFill>
+                  <a:schemeClr val="bg1"/>
+                </a:solidFill>
+              </a:rPr>
+              <a:t>Dataflows</a:t>
             </a:r>
           </a:p>
         </p:txBody>
@@ -10780,7 +11159,7 @@
                   </a:schemeClr>
                 </a:solidFill>
               </a:rPr>
-              <a:t>Link to slides</a:t>
+              <a:t>Link to slides, content</a:t>
             </a:r>
           </a:p>
         </p:txBody>
@@ -21707,18 +22086,18 @@
 </file>
 
 <file path=customXml/item2.xml><?xml version="1.0" encoding="utf-8"?>
+<p:properties xmlns:p="http://schemas.microsoft.com/office/2006/metadata/properties" xmlns:xsi="http://www.w3.org/2001/XMLSchema-instance" xmlns:pc="http://schemas.microsoft.com/office/infopath/2007/PartnerControls">
+  <documentManagement/>
+</p:properties>
+</file>
+
+<file path=customXml/item3.xml><?xml version="1.0" encoding="utf-8"?>
 <?mso-contentType ?>
 <FormTemplates xmlns="http://schemas.microsoft.com/sharepoint/v3/contenttype/forms">
   <Display>DocumentLibraryForm</Display>
   <Edit>DocumentLibraryForm</Edit>
   <New>DocumentLibraryForm</New>
 </FormTemplates>
-</file>
-
-<file path=customXml/item3.xml><?xml version="1.0" encoding="utf-8"?>
-<p:properties xmlns:p="http://schemas.microsoft.com/office/2006/metadata/properties" xmlns:xsi="http://www.w3.org/2001/XMLSchema-instance" xmlns:pc="http://schemas.microsoft.com/office/infopath/2007/PartnerControls">
-  <documentManagement/>
-</p:properties>
 </file>
 
 <file path=customXml/itemProps1.xml><?xml version="1.0" encoding="utf-8"?>
@@ -21741,18 +22120,18 @@
 </file>
 
 <file path=customXml/itemProps2.xml><?xml version="1.0" encoding="utf-8"?>
-<ds:datastoreItem xmlns:ds="http://schemas.openxmlformats.org/officeDocument/2006/customXml" ds:itemID="{10C75660-6496-4BAB-8878-FA53D17BE5D9}">
-  <ds:schemaRefs>
-    <ds:schemaRef ds:uri="http://schemas.microsoft.com/sharepoint/v3/contenttype/forms"/>
-  </ds:schemaRefs>
-</ds:datastoreItem>
-</file>
-
-<file path=customXml/itemProps3.xml><?xml version="1.0" encoding="utf-8"?>
 <ds:datastoreItem xmlns:ds="http://schemas.openxmlformats.org/officeDocument/2006/customXml" ds:itemID="{A2AA3CB1-2443-4FA1-815D-951C2BDC7424}">
   <ds:schemaRefs>
     <ds:schemaRef ds:uri="http://schemas.microsoft.com/office/2006/metadata/properties"/>
     <ds:schemaRef ds:uri="http://schemas.microsoft.com/office/infopath/2007/PartnerControls"/>
   </ds:schemaRefs>
 </ds:datastoreItem>
+</file>
+
+<file path=customXml/itemProps3.xml><?xml version="1.0" encoding="utf-8"?>
+<ds:datastoreItem xmlns:ds="http://schemas.openxmlformats.org/officeDocument/2006/customXml" ds:itemID="{10C75660-6496-4BAB-8878-FA53D17BE5D9}">
+  <ds:schemaRefs>
+    <ds:schemaRef ds:uri="http://schemas.microsoft.com/sharepoint/v3/contenttype/forms"/>
+  </ds:schemaRefs>
+</ds:datastoreItem>
 </file>
</xml_diff>